<commit_message>
Fix LOC comparison to show aggregate vs orchestrator approach
Co-authored-by: Paradoxicaly <91711641+Paradoxicaly@users.noreply.github.com>
</commit_message>
<xml_diff>
--- a/slides/FastMDAnalysis_benchmarks_trpcage.pptx
+++ b/slides/FastMDAnalysis_benchmarks_trpcage.pptx
@@ -3701,7 +3701,7 @@
               <a:defRPr sz="1600"/>
             </a:pPr>
             <a:r>
-              <a:t>Runtime overview: FastMDAnalysis 4.22s calc / 0.12s plot / 0.00s overhead (4.34s total), Mdtraj 0.16s calc / 2.84s plot / 0.08s overhead (3.08s total), Mdanalysis 4.50s calc / 2.85s plot / 0.01s overhead (7.36s total).</a:t>
+              <a:t>Runtime overview: FastMDAnalysis 4.15s calc / 0.11s plot / 0.00s overhead (4.27s total), Mdtraj 0.16s calc / 2.90s plot / 0.08s overhead (3.14s total), Mdanalysis 4.57s calc / 2.95s plot / 0.01s overhead (7.53s total).</a:t>
             </a:r>
           </a:p>
           <a:p>
@@ -3709,7 +3709,7 @@
               <a:defRPr sz="1600"/>
             </a:pPr>
             <a:r>
-              <a:t>Peak memory overview: FastMDAnalysis 36.81 MB calc / 1.95 MB plot (36.81 MB peak), Mdtraj 59.16 MB calc / 18.32 MB plot (71.86 MB peak), Mdanalysis 1.70 MB calc / 18.88 MB plot (18.88 MB peak).</a:t>
+              <a:t>Peak memory overview: FastMDAnalysis 36.76 MB calc / 1.89 MB plot (36.76 MB peak), Mdtraj 59.14 MB calc / 18.24 MB plot (71.78 MB peak), Mdanalysis 1.70 MB calc / 18.89 MB plot (18.89 MB peak).</a:t>
             </a:r>
           </a:p>
           <a:p>
@@ -3984,6 +3984,30 @@
           </a:prstGeom>
         </p:spPr>
       </p:pic>
+      <p:pic>
+        <p:nvPicPr>
+          <p:cNvPr id="6" name="Picture 5" descr="orchestrator_loc_advantage.png"/>
+          <p:cNvPicPr>
+            <a:picLocks noChangeAspect="1"/>
+          </p:cNvPicPr>
+          <p:nvPr/>
+        </p:nvPicPr>
+        <p:blipFill>
+          <a:blip r:embed="rId5"/>
+          <a:stretch>
+            <a:fillRect/>
+          </a:stretch>
+        </p:blipFill>
+        <p:spPr>
+          <a:xfrm>
+            <a:off x="4572000" y="3840480"/>
+            <a:ext cx="3657600" cy="1787286"/>
+          </a:xfrm>
+          <a:prstGeom prst="rect">
+            <a:avLst/>
+          </a:prstGeom>
+        </p:spPr>
+      </p:pic>
     </p:spTree>
   </p:cSld>
   <p:clrMapOvr>
@@ -4808,7 +4832,7 @@
         <p:spPr>
           <a:xfrm>
             <a:off x="457200" y="1097280"/>
-            <a:ext cx="3657600" cy="2312547"/>
+            <a:ext cx="3657600" cy="2268638"/>
           </a:xfrm>
           <a:prstGeom prst="rect">
             <a:avLst/>

</xml_diff>

<commit_message>
Fix orchestrator benchmark to show single-line analyze approach with proper calc/plot time separation
Co-authored-by: Paradoxicaly <91711641+Paradoxicaly@users.noreply.github.com>
</commit_message>
<xml_diff>
--- a/slides/FastMDAnalysis_benchmarks_trpcage.pptx
+++ b/slides/FastMDAnalysis_benchmarks_trpcage.pptx
@@ -3414,7 +3414,7 @@
         <p:spPr>
           <a:xfrm>
             <a:off x="4572000" y="1097280"/>
-            <a:ext cx="3657600" cy="2229134"/>
+            <a:ext cx="3657600" cy="2268638"/>
           </a:xfrm>
           <a:prstGeom prst="rect">
             <a:avLst/>
@@ -3701,7 +3701,7 @@
               <a:defRPr sz="1600"/>
             </a:pPr>
             <a:r>
-              <a:t>Runtime overview: FastMDAnalysis 4.15s calc / 0.11s plot / 0.00s overhead (4.27s total), Mdtraj 0.16s calc / 2.90s plot / 0.08s overhead (3.14s total), Mdanalysis 4.57s calc / 2.95s plot / 0.01s overhead (7.53s total).</a:t>
+              <a:t>Runtime overview: FastMDAnalysis 0.73s calc / 3.46s plot (4.19s total), Mdtraj 0.16s calc / 2.92s plot / 0.08s overhead (3.16s total), Mdanalysis 4.62s calc / 2.95s plot / 0.01s overhead (7.58s total).</a:t>
             </a:r>
           </a:p>
           <a:p>
@@ -3709,7 +3709,7 @@
               <a:defRPr sz="1600"/>
             </a:pPr>
             <a:r>
-              <a:t>Peak memory overview: FastMDAnalysis 36.76 MB calc / 1.89 MB plot (36.76 MB peak), Mdtraj 59.14 MB calc / 18.24 MB plot (71.78 MB peak), Mdanalysis 1.70 MB calc / 18.89 MB plot (18.89 MB peak).</a:t>
+              <a:t>Peak memory overview: FastMDAnalysis 36.83 MB calc / 0.00 MB plot (36.83 MB peak), Mdtraj 59.15 MB calc / 18.24 MB plot (71.78 MB peak), Mdanalysis 1.70 MB calc / 18.89 MB plot (18.89 MB peak).</a:t>
             </a:r>
           </a:p>
           <a:p>

</xml_diff>